<commit_message>
Cars example with UML
</commit_message>
<xml_diff>
--- a/visual-notes.pptx
+++ b/visual-notes.pptx
@@ -7,6 +7,7 @@
   <p:sldIdLst>
     <p:sldId id="256" r:id="rId2"/>
     <p:sldId id="257" r:id="rId3"/>
+    <p:sldId id="258" r:id="rId4"/>
   </p:sldIdLst>
   <p:sldSz cx="12192000" cy="6858000"/>
   <p:notesSz cx="6858000" cy="9144000"/>
@@ -105,6 +106,11 @@
       </a:defRPr>
     </a:lvl9pPr>
   </p:defaultTextStyle>
+  <p:extLst>
+    <p:ext uri="{EFAFB233-063F-42B5-8137-9DF3F51BA10A}">
+      <p15:sldGuideLst xmlns:p15="http://schemas.microsoft.com/office/powerpoint/2012/main"/>
+    </p:ext>
+  </p:extLst>
 </p:presentation>
 </file>
 
@@ -255,7 +261,7 @@
           <a:p>
             <a:fld id="{2AEE9303-DCDE-4639-A0D3-F2A05E71C494}" type="datetimeFigureOut">
               <a:rPr lang="en-US" smtClean="0"/>
-              <a:t>3/18/2020</a:t>
+              <a:t>3/29/2020</a:t>
             </a:fld>
             <a:endParaRPr lang="en-US"/>
           </a:p>
@@ -453,7 +459,7 @@
           <a:p>
             <a:fld id="{2AEE9303-DCDE-4639-A0D3-F2A05E71C494}" type="datetimeFigureOut">
               <a:rPr lang="en-US" smtClean="0"/>
-              <a:t>3/18/2020</a:t>
+              <a:t>3/29/2020</a:t>
             </a:fld>
             <a:endParaRPr lang="en-US"/>
           </a:p>
@@ -661,7 +667,7 @@
           <a:p>
             <a:fld id="{2AEE9303-DCDE-4639-A0D3-F2A05E71C494}" type="datetimeFigureOut">
               <a:rPr lang="en-US" smtClean="0"/>
-              <a:t>3/18/2020</a:t>
+              <a:t>3/29/2020</a:t>
             </a:fld>
             <a:endParaRPr lang="en-US"/>
           </a:p>
@@ -859,7 +865,7 @@
           <a:p>
             <a:fld id="{2AEE9303-DCDE-4639-A0D3-F2A05E71C494}" type="datetimeFigureOut">
               <a:rPr lang="en-US" smtClean="0"/>
-              <a:t>3/18/2020</a:t>
+              <a:t>3/29/2020</a:t>
             </a:fld>
             <a:endParaRPr lang="en-US"/>
           </a:p>
@@ -1134,7 +1140,7 @@
           <a:p>
             <a:fld id="{2AEE9303-DCDE-4639-A0D3-F2A05E71C494}" type="datetimeFigureOut">
               <a:rPr lang="en-US" smtClean="0"/>
-              <a:t>3/18/2020</a:t>
+              <a:t>3/29/2020</a:t>
             </a:fld>
             <a:endParaRPr lang="en-US"/>
           </a:p>
@@ -1399,7 +1405,7 @@
           <a:p>
             <a:fld id="{2AEE9303-DCDE-4639-A0D3-F2A05E71C494}" type="datetimeFigureOut">
               <a:rPr lang="en-US" smtClean="0"/>
-              <a:t>3/18/2020</a:t>
+              <a:t>3/29/2020</a:t>
             </a:fld>
             <a:endParaRPr lang="en-US"/>
           </a:p>
@@ -1811,7 +1817,7 @@
           <a:p>
             <a:fld id="{2AEE9303-DCDE-4639-A0D3-F2A05E71C494}" type="datetimeFigureOut">
               <a:rPr lang="en-US" smtClean="0"/>
-              <a:t>3/18/2020</a:t>
+              <a:t>3/29/2020</a:t>
             </a:fld>
             <a:endParaRPr lang="en-US"/>
           </a:p>
@@ -1952,7 +1958,7 @@
           <a:p>
             <a:fld id="{2AEE9303-DCDE-4639-A0D3-F2A05E71C494}" type="datetimeFigureOut">
               <a:rPr lang="en-US" smtClean="0"/>
-              <a:t>3/18/2020</a:t>
+              <a:t>3/29/2020</a:t>
             </a:fld>
             <a:endParaRPr lang="en-US"/>
           </a:p>
@@ -2065,7 +2071,7 @@
           <a:p>
             <a:fld id="{2AEE9303-DCDE-4639-A0D3-F2A05E71C494}" type="datetimeFigureOut">
               <a:rPr lang="en-US" smtClean="0"/>
-              <a:t>3/18/2020</a:t>
+              <a:t>3/29/2020</a:t>
             </a:fld>
             <a:endParaRPr lang="en-US"/>
           </a:p>
@@ -2376,7 +2382,7 @@
           <a:p>
             <a:fld id="{2AEE9303-DCDE-4639-A0D3-F2A05E71C494}" type="datetimeFigureOut">
               <a:rPr lang="en-US" smtClean="0"/>
-              <a:t>3/18/2020</a:t>
+              <a:t>3/29/2020</a:t>
             </a:fld>
             <a:endParaRPr lang="en-US"/>
           </a:p>
@@ -2664,7 +2670,7 @@
           <a:p>
             <a:fld id="{2AEE9303-DCDE-4639-A0D3-F2A05E71C494}" type="datetimeFigureOut">
               <a:rPr lang="en-US" smtClean="0"/>
-              <a:t>3/18/2020</a:t>
+              <a:t>3/29/2020</a:t>
             </a:fld>
             <a:endParaRPr lang="en-US"/>
           </a:p>
@@ -2905,7 +2911,7 @@
           <a:p>
             <a:fld id="{2AEE9303-DCDE-4639-A0D3-F2A05E71C494}" type="datetimeFigureOut">
               <a:rPr lang="en-US" smtClean="0"/>
-              <a:t>3/18/2020</a:t>
+              <a:t>3/29/2020</a:t>
             </a:fld>
             <a:endParaRPr lang="en-US"/>
           </a:p>
@@ -4374,6 +4380,1834 @@
 </p:sld>
 </file>
 
+<file path=ppt/slides/slide3.xml><?xml version="1.0" encoding="utf-8"?>
+<p:sld xmlns:a="http://schemas.openxmlformats.org/drawingml/2006/main" xmlns:r="http://schemas.openxmlformats.org/officeDocument/2006/relationships" xmlns:p="http://schemas.openxmlformats.org/presentationml/2006/main">
+  <p:cSld>
+    <p:spTree>
+      <p:nvGrpSpPr>
+        <p:cNvPr id="1" name=""/>
+        <p:cNvGrpSpPr/>
+        <p:nvPr/>
+      </p:nvGrpSpPr>
+      <p:grpSpPr>
+        <a:xfrm>
+          <a:off x="0" y="0"/>
+          <a:ext cx="0" cy="0"/>
+          <a:chOff x="0" y="0"/>
+          <a:chExt cx="0" cy="0"/>
+        </a:xfrm>
+      </p:grpSpPr>
+      <p:sp>
+        <p:nvSpPr>
+          <p:cNvPr id="4" name="Rectangle 3">
+            <a:extLst>
+              <a:ext uri="{FF2B5EF4-FFF2-40B4-BE49-F238E27FC236}">
+                <a16:creationId xmlns:a16="http://schemas.microsoft.com/office/drawing/2014/main" id="{C08C6477-3834-4E5B-8605-08720BFE8C49}"/>
+              </a:ext>
+            </a:extLst>
+          </p:cNvPr>
+          <p:cNvSpPr/>
+          <p:nvPr/>
+        </p:nvSpPr>
+        <p:spPr>
+          <a:xfrm>
+            <a:off x="442032" y="355359"/>
+            <a:ext cx="11258821" cy="6348796"/>
+          </a:xfrm>
+          <a:prstGeom prst="rect">
+            <a:avLst/>
+          </a:prstGeom>
+        </p:spPr>
+        <p:style>
+          <a:lnRef idx="2">
+            <a:schemeClr val="accent1"/>
+          </a:lnRef>
+          <a:fillRef idx="1">
+            <a:schemeClr val="lt1"/>
+          </a:fillRef>
+          <a:effectRef idx="0">
+            <a:schemeClr val="accent1"/>
+          </a:effectRef>
+          <a:fontRef idx="minor">
+            <a:schemeClr val="dk1"/>
+          </a:fontRef>
+        </p:style>
+        <p:txBody>
+          <a:bodyPr rtlCol="0" anchor="t"/>
+          <a:lstStyle/>
+          <a:p>
+            <a:pPr algn="ctr"/>
+            <a:r>
+              <a:rPr lang="en-US" dirty="0"/>
+              <a:t>JVM</a:t>
+            </a:r>
+          </a:p>
+        </p:txBody>
+      </p:sp>
+      <p:sp>
+        <p:nvSpPr>
+          <p:cNvPr id="5" name="Rectangle 4">
+            <a:extLst>
+              <a:ext uri="{FF2B5EF4-FFF2-40B4-BE49-F238E27FC236}">
+                <a16:creationId xmlns:a16="http://schemas.microsoft.com/office/drawing/2014/main" id="{B40D2FD1-5F36-4525-B77A-9271FB958AC6}"/>
+              </a:ext>
+            </a:extLst>
+          </p:cNvPr>
+          <p:cNvSpPr/>
+          <p:nvPr/>
+        </p:nvSpPr>
+        <p:spPr>
+          <a:xfrm>
+            <a:off x="594432" y="710717"/>
+            <a:ext cx="2356783" cy="5846093"/>
+          </a:xfrm>
+          <a:prstGeom prst="rect">
+            <a:avLst/>
+          </a:prstGeom>
+        </p:spPr>
+        <p:style>
+          <a:lnRef idx="2">
+            <a:schemeClr val="accent1"/>
+          </a:lnRef>
+          <a:fillRef idx="1">
+            <a:schemeClr val="lt1"/>
+          </a:fillRef>
+          <a:effectRef idx="0">
+            <a:schemeClr val="accent1"/>
+          </a:effectRef>
+          <a:fontRef idx="minor">
+            <a:schemeClr val="dk1"/>
+          </a:fontRef>
+        </p:style>
+        <p:txBody>
+          <a:bodyPr rtlCol="0" anchor="t"/>
+          <a:lstStyle/>
+          <a:p>
+            <a:pPr algn="ctr"/>
+            <a:r>
+              <a:rPr lang="en-US" dirty="0"/>
+              <a:t>PM</a:t>
+            </a:r>
+          </a:p>
+        </p:txBody>
+      </p:sp>
+      <p:sp>
+        <p:nvSpPr>
+          <p:cNvPr id="6" name="Rectangle 5">
+            <a:extLst>
+              <a:ext uri="{FF2B5EF4-FFF2-40B4-BE49-F238E27FC236}">
+                <a16:creationId xmlns:a16="http://schemas.microsoft.com/office/drawing/2014/main" id="{FF2FDF0B-70EC-461E-907F-D3D8151BCB1F}"/>
+              </a:ext>
+            </a:extLst>
+          </p:cNvPr>
+          <p:cNvSpPr/>
+          <p:nvPr/>
+        </p:nvSpPr>
+        <p:spPr>
+          <a:xfrm>
+            <a:off x="3884395" y="710717"/>
+            <a:ext cx="2781481" cy="5846093"/>
+          </a:xfrm>
+          <a:prstGeom prst="rect">
+            <a:avLst/>
+          </a:prstGeom>
+        </p:spPr>
+        <p:style>
+          <a:lnRef idx="2">
+            <a:schemeClr val="accent1"/>
+          </a:lnRef>
+          <a:fillRef idx="1">
+            <a:schemeClr val="lt1"/>
+          </a:fillRef>
+          <a:effectRef idx="0">
+            <a:schemeClr val="accent1"/>
+          </a:effectRef>
+          <a:fontRef idx="minor">
+            <a:schemeClr val="dk1"/>
+          </a:fontRef>
+        </p:style>
+        <p:txBody>
+          <a:bodyPr rtlCol="0" anchor="t"/>
+          <a:lstStyle/>
+          <a:p>
+            <a:pPr algn="ctr"/>
+            <a:r>
+              <a:rPr lang="en-US" dirty="0"/>
+              <a:t>References</a:t>
+            </a:r>
+          </a:p>
+        </p:txBody>
+      </p:sp>
+      <p:sp>
+        <p:nvSpPr>
+          <p:cNvPr id="7" name="Rectangle 6">
+            <a:extLst>
+              <a:ext uri="{FF2B5EF4-FFF2-40B4-BE49-F238E27FC236}">
+                <a16:creationId xmlns:a16="http://schemas.microsoft.com/office/drawing/2014/main" id="{BA9C014B-0983-4A0A-B8C5-4C7D8F9A0575}"/>
+              </a:ext>
+            </a:extLst>
+          </p:cNvPr>
+          <p:cNvSpPr/>
+          <p:nvPr/>
+        </p:nvSpPr>
+        <p:spPr>
+          <a:xfrm>
+            <a:off x="6923006" y="710717"/>
+            <a:ext cx="4517828" cy="5846093"/>
+          </a:xfrm>
+          <a:prstGeom prst="rect">
+            <a:avLst/>
+          </a:prstGeom>
+        </p:spPr>
+        <p:style>
+          <a:lnRef idx="2">
+            <a:schemeClr val="accent1"/>
+          </a:lnRef>
+          <a:fillRef idx="1">
+            <a:schemeClr val="lt1"/>
+          </a:fillRef>
+          <a:effectRef idx="0">
+            <a:schemeClr val="accent1"/>
+          </a:effectRef>
+          <a:fontRef idx="minor">
+            <a:schemeClr val="dk1"/>
+          </a:fontRef>
+        </p:style>
+        <p:txBody>
+          <a:bodyPr rtlCol="0" anchor="t"/>
+          <a:lstStyle/>
+          <a:p>
+            <a:pPr algn="ctr"/>
+            <a:r>
+              <a:rPr lang="en-US" dirty="0"/>
+              <a:t>Heap</a:t>
+            </a:r>
+          </a:p>
+        </p:txBody>
+      </p:sp>
+      <p:sp>
+        <p:nvSpPr>
+          <p:cNvPr id="8" name="Rectangle 7">
+            <a:extLst>
+              <a:ext uri="{FF2B5EF4-FFF2-40B4-BE49-F238E27FC236}">
+                <a16:creationId xmlns:a16="http://schemas.microsoft.com/office/drawing/2014/main" id="{28A8B98C-E383-4461-9C7F-67B4C0BF70A4}"/>
+              </a:ext>
+            </a:extLst>
+          </p:cNvPr>
+          <p:cNvSpPr/>
+          <p:nvPr/>
+        </p:nvSpPr>
+        <p:spPr>
+          <a:xfrm>
+            <a:off x="751166" y="1135417"/>
+            <a:ext cx="2000702" cy="767055"/>
+          </a:xfrm>
+          <a:prstGeom prst="rect">
+            <a:avLst/>
+          </a:prstGeom>
+        </p:spPr>
+        <p:style>
+          <a:lnRef idx="2">
+            <a:schemeClr val="accent1"/>
+          </a:lnRef>
+          <a:fillRef idx="1">
+            <a:schemeClr val="lt1"/>
+          </a:fillRef>
+          <a:effectRef idx="0">
+            <a:schemeClr val="accent1"/>
+          </a:effectRef>
+          <a:fontRef idx="minor">
+            <a:schemeClr val="dk1"/>
+          </a:fontRef>
+        </p:style>
+        <p:txBody>
+          <a:bodyPr rtlCol="0" anchor="t"/>
+          <a:lstStyle/>
+          <a:p>
+            <a:pPr algn="ctr"/>
+            <a:r>
+              <a:rPr lang="en-US" dirty="0"/>
+              <a:t>Brand</a:t>
+            </a:r>
+          </a:p>
+        </p:txBody>
+      </p:sp>
+      <p:sp>
+        <p:nvSpPr>
+          <p:cNvPr id="9" name="Rectangle 8">
+            <a:extLst>
+              <a:ext uri="{FF2B5EF4-FFF2-40B4-BE49-F238E27FC236}">
+                <a16:creationId xmlns:a16="http://schemas.microsoft.com/office/drawing/2014/main" id="{6FF97620-3945-43C4-8AEA-F0D0EF38525A}"/>
+              </a:ext>
+            </a:extLst>
+          </p:cNvPr>
+          <p:cNvSpPr/>
+          <p:nvPr/>
+        </p:nvSpPr>
+        <p:spPr>
+          <a:xfrm>
+            <a:off x="4780015" y="1568781"/>
+            <a:ext cx="1092080" cy="286020"/>
+          </a:xfrm>
+          <a:prstGeom prst="rect">
+            <a:avLst/>
+          </a:prstGeom>
+        </p:spPr>
+        <p:style>
+          <a:lnRef idx="2">
+            <a:schemeClr val="accent1">
+              <a:shade val="50000"/>
+            </a:schemeClr>
+          </a:lnRef>
+          <a:fillRef idx="1">
+            <a:schemeClr val="accent1"/>
+          </a:fillRef>
+          <a:effectRef idx="0">
+            <a:schemeClr val="accent1"/>
+          </a:effectRef>
+          <a:fontRef idx="minor">
+            <a:schemeClr val="lt1"/>
+          </a:fontRef>
+        </p:style>
+        <p:txBody>
+          <a:bodyPr rtlCol="0" anchor="ctr"/>
+          <a:lstStyle/>
+          <a:p>
+            <a:pPr algn="ctr"/>
+            <a:r>
+              <a:rPr lang="en-US" dirty="0" err="1"/>
+              <a:t>mercedes</a:t>
+            </a:r>
+            <a:endParaRPr lang="en-US" dirty="0"/>
+          </a:p>
+        </p:txBody>
+      </p:sp>
+      <p:cxnSp>
+        <p:nvCxnSpPr>
+          <p:cNvPr id="11" name="Straight Arrow Connector 10">
+            <a:extLst>
+              <a:ext uri="{FF2B5EF4-FFF2-40B4-BE49-F238E27FC236}">
+                <a16:creationId xmlns:a16="http://schemas.microsoft.com/office/drawing/2014/main" id="{FFBB3969-1832-467A-9E49-6AA7B0084127}"/>
+              </a:ext>
+            </a:extLst>
+          </p:cNvPr>
+          <p:cNvCxnSpPr/>
+          <p:nvPr/>
+        </p:nvCxnSpPr>
+        <p:spPr>
+          <a:xfrm flipH="1" flipV="1">
+            <a:off x="2244830" y="1677122"/>
+            <a:ext cx="2712865" cy="52004"/>
+          </a:xfrm>
+          <a:prstGeom prst="straightConnector1">
+            <a:avLst/>
+          </a:prstGeom>
+          <a:ln>
+            <a:tailEnd type="triangle"/>
+          </a:ln>
+        </p:spPr>
+        <p:style>
+          <a:lnRef idx="1">
+            <a:schemeClr val="accent1"/>
+          </a:lnRef>
+          <a:fillRef idx="0">
+            <a:schemeClr val="accent1"/>
+          </a:fillRef>
+          <a:effectRef idx="0">
+            <a:schemeClr val="accent1"/>
+          </a:effectRef>
+          <a:fontRef idx="minor">
+            <a:schemeClr val="tx1"/>
+          </a:fontRef>
+        </p:style>
+      </p:cxnSp>
+      <p:sp>
+        <p:nvSpPr>
+          <p:cNvPr id="12" name="Rectangle 11">
+            <a:extLst>
+              <a:ext uri="{FF2B5EF4-FFF2-40B4-BE49-F238E27FC236}">
+                <a16:creationId xmlns:a16="http://schemas.microsoft.com/office/drawing/2014/main" id="{181B6B73-486E-4988-9A7B-B909B488ADF2}"/>
+              </a:ext>
+            </a:extLst>
+          </p:cNvPr>
+          <p:cNvSpPr/>
+          <p:nvPr/>
+        </p:nvSpPr>
+        <p:spPr>
+          <a:xfrm>
+            <a:off x="7091295" y="1031048"/>
+            <a:ext cx="2000702" cy="1292148"/>
+          </a:xfrm>
+          <a:prstGeom prst="rect">
+            <a:avLst/>
+          </a:prstGeom>
+        </p:spPr>
+        <p:style>
+          <a:lnRef idx="2">
+            <a:schemeClr val="accent1"/>
+          </a:lnRef>
+          <a:fillRef idx="1">
+            <a:schemeClr val="lt1"/>
+          </a:fillRef>
+          <a:effectRef idx="0">
+            <a:schemeClr val="accent1"/>
+          </a:effectRef>
+          <a:fontRef idx="minor">
+            <a:schemeClr val="dk1"/>
+          </a:fontRef>
+        </p:style>
+        <p:txBody>
+          <a:bodyPr rtlCol="0" anchor="t"/>
+          <a:lstStyle/>
+          <a:p>
+            <a:pPr algn="ctr"/>
+            <a:r>
+              <a:rPr lang="en-US" dirty="0"/>
+              <a:t>Brand</a:t>
+            </a:r>
+          </a:p>
+          <a:p>
+            <a:pPr algn="ctr"/>
+            <a:r>
+              <a:rPr lang="en-US" dirty="0"/>
+              <a:t>------------------</a:t>
+            </a:r>
+          </a:p>
+          <a:p>
+            <a:pPr algn="ctr"/>
+            <a:r>
+              <a:rPr lang="en-US" dirty="0" err="1"/>
+              <a:t>Mercedes,www</a:t>
+            </a:r>
+            <a:r>
+              <a:rPr lang="en-US" dirty="0"/>
+              <a:t>., Daimler</a:t>
+            </a:r>
+          </a:p>
+        </p:txBody>
+      </p:sp>
+      <p:cxnSp>
+        <p:nvCxnSpPr>
+          <p:cNvPr id="14" name="Straight Arrow Connector 13">
+            <a:extLst>
+              <a:ext uri="{FF2B5EF4-FFF2-40B4-BE49-F238E27FC236}">
+                <a16:creationId xmlns:a16="http://schemas.microsoft.com/office/drawing/2014/main" id="{BAD9A606-3C36-412C-9049-F1CB9AE087EA}"/>
+              </a:ext>
+            </a:extLst>
+          </p:cNvPr>
+          <p:cNvCxnSpPr/>
+          <p:nvPr/>
+        </p:nvCxnSpPr>
+        <p:spPr>
+          <a:xfrm>
+            <a:off x="5690082" y="1711791"/>
+            <a:ext cx="2188492" cy="69700"/>
+          </a:xfrm>
+          <a:prstGeom prst="straightConnector1">
+            <a:avLst/>
+          </a:prstGeom>
+          <a:ln>
+            <a:tailEnd type="triangle"/>
+          </a:ln>
+        </p:spPr>
+        <p:style>
+          <a:lnRef idx="1">
+            <a:schemeClr val="accent1"/>
+          </a:lnRef>
+          <a:fillRef idx="0">
+            <a:schemeClr val="accent1"/>
+          </a:fillRef>
+          <a:effectRef idx="0">
+            <a:schemeClr val="accent1"/>
+          </a:effectRef>
+          <a:fontRef idx="minor">
+            <a:schemeClr val="tx1"/>
+          </a:fontRef>
+        </p:style>
+      </p:cxnSp>
+      <p:sp>
+        <p:nvSpPr>
+          <p:cNvPr id="15" name="Rectangle 14">
+            <a:extLst>
+              <a:ext uri="{FF2B5EF4-FFF2-40B4-BE49-F238E27FC236}">
+                <a16:creationId xmlns:a16="http://schemas.microsoft.com/office/drawing/2014/main" id="{BA1D1C4F-5615-4E04-8B17-D5916FB7D110}"/>
+              </a:ext>
+            </a:extLst>
+          </p:cNvPr>
+          <p:cNvSpPr/>
+          <p:nvPr/>
+        </p:nvSpPr>
+        <p:spPr>
+          <a:xfrm>
+            <a:off x="772472" y="2643526"/>
+            <a:ext cx="2000702" cy="805152"/>
+          </a:xfrm>
+          <a:prstGeom prst="rect">
+            <a:avLst/>
+          </a:prstGeom>
+        </p:spPr>
+        <p:style>
+          <a:lnRef idx="2">
+            <a:schemeClr val="accent1"/>
+          </a:lnRef>
+          <a:fillRef idx="1">
+            <a:schemeClr val="lt1"/>
+          </a:fillRef>
+          <a:effectRef idx="0">
+            <a:schemeClr val="accent1"/>
+          </a:effectRef>
+          <a:fontRef idx="minor">
+            <a:schemeClr val="dk1"/>
+          </a:fontRef>
+        </p:style>
+        <p:txBody>
+          <a:bodyPr rtlCol="0" anchor="t"/>
+          <a:lstStyle/>
+          <a:p>
+            <a:pPr algn="ctr"/>
+            <a:r>
+              <a:rPr lang="en-US" dirty="0"/>
+              <a:t>Dealer</a:t>
+            </a:r>
+          </a:p>
+        </p:txBody>
+      </p:sp>
+      <p:sp>
+        <p:nvSpPr>
+          <p:cNvPr id="16" name="Rectangle 15">
+            <a:extLst>
+              <a:ext uri="{FF2B5EF4-FFF2-40B4-BE49-F238E27FC236}">
+                <a16:creationId xmlns:a16="http://schemas.microsoft.com/office/drawing/2014/main" id="{95AF0962-4C6E-4D07-9392-74BCDC253716}"/>
+              </a:ext>
+            </a:extLst>
+          </p:cNvPr>
+          <p:cNvSpPr/>
+          <p:nvPr/>
+        </p:nvSpPr>
+        <p:spPr>
+          <a:xfrm>
+            <a:off x="4729095" y="3133588"/>
+            <a:ext cx="1092080" cy="286020"/>
+          </a:xfrm>
+          <a:prstGeom prst="rect">
+            <a:avLst/>
+          </a:prstGeom>
+        </p:spPr>
+        <p:style>
+          <a:lnRef idx="2">
+            <a:schemeClr val="accent1">
+              <a:shade val="50000"/>
+            </a:schemeClr>
+          </a:lnRef>
+          <a:fillRef idx="1">
+            <a:schemeClr val="accent1"/>
+          </a:fillRef>
+          <a:effectRef idx="0">
+            <a:schemeClr val="accent1"/>
+          </a:effectRef>
+          <a:fontRef idx="minor">
+            <a:schemeClr val="lt1"/>
+          </a:fontRef>
+        </p:style>
+        <p:txBody>
+          <a:bodyPr rtlCol="0" anchor="ctr"/>
+          <a:lstStyle/>
+          <a:p>
+            <a:pPr algn="ctr"/>
+            <a:r>
+              <a:rPr lang="en-US" dirty="0" err="1"/>
+              <a:t>gragour</a:t>
+            </a:r>
+            <a:endParaRPr lang="en-US" dirty="0"/>
+          </a:p>
+        </p:txBody>
+      </p:sp>
+      <p:cxnSp>
+        <p:nvCxnSpPr>
+          <p:cNvPr id="17" name="Straight Arrow Connector 16">
+            <a:extLst>
+              <a:ext uri="{FF2B5EF4-FFF2-40B4-BE49-F238E27FC236}">
+                <a16:creationId xmlns:a16="http://schemas.microsoft.com/office/drawing/2014/main" id="{C0F76ECA-3C55-4E71-8AC0-908F9F938239}"/>
+              </a:ext>
+            </a:extLst>
+          </p:cNvPr>
+          <p:cNvCxnSpPr/>
+          <p:nvPr/>
+        </p:nvCxnSpPr>
+        <p:spPr>
+          <a:xfrm flipH="1" flipV="1">
+            <a:off x="2240135" y="3244457"/>
+            <a:ext cx="2712865" cy="52004"/>
+          </a:xfrm>
+          <a:prstGeom prst="straightConnector1">
+            <a:avLst/>
+          </a:prstGeom>
+          <a:ln>
+            <a:tailEnd type="triangle"/>
+          </a:ln>
+        </p:spPr>
+        <p:style>
+          <a:lnRef idx="1">
+            <a:schemeClr val="accent1"/>
+          </a:lnRef>
+          <a:fillRef idx="0">
+            <a:schemeClr val="accent1"/>
+          </a:fillRef>
+          <a:effectRef idx="0">
+            <a:schemeClr val="accent1"/>
+          </a:effectRef>
+          <a:fontRef idx="minor">
+            <a:schemeClr val="tx1"/>
+          </a:fontRef>
+        </p:style>
+      </p:cxnSp>
+      <p:sp>
+        <p:nvSpPr>
+          <p:cNvPr id="18" name="Rectangle 17">
+            <a:extLst>
+              <a:ext uri="{FF2B5EF4-FFF2-40B4-BE49-F238E27FC236}">
+                <a16:creationId xmlns:a16="http://schemas.microsoft.com/office/drawing/2014/main" id="{8B6A97D9-8B45-4CBD-88A5-64AB64A53019}"/>
+              </a:ext>
+            </a:extLst>
+          </p:cNvPr>
+          <p:cNvSpPr/>
+          <p:nvPr/>
+        </p:nvSpPr>
+        <p:spPr>
+          <a:xfrm>
+            <a:off x="7091295" y="2528863"/>
+            <a:ext cx="2000702" cy="1453579"/>
+          </a:xfrm>
+          <a:prstGeom prst="rect">
+            <a:avLst/>
+          </a:prstGeom>
+        </p:spPr>
+        <p:style>
+          <a:lnRef idx="2">
+            <a:schemeClr val="accent1"/>
+          </a:lnRef>
+          <a:fillRef idx="1">
+            <a:schemeClr val="lt1"/>
+          </a:fillRef>
+          <a:effectRef idx="0">
+            <a:schemeClr val="accent1"/>
+          </a:effectRef>
+          <a:fontRef idx="minor">
+            <a:schemeClr val="dk1"/>
+          </a:fontRef>
+        </p:style>
+        <p:txBody>
+          <a:bodyPr rtlCol="0" anchor="t"/>
+          <a:lstStyle/>
+          <a:p>
+            <a:pPr algn="ctr"/>
+            <a:r>
+              <a:rPr lang="en-US" dirty="0"/>
+              <a:t>Dealer</a:t>
+            </a:r>
+          </a:p>
+          <a:p>
+            <a:pPr algn="ctr"/>
+            <a:r>
+              <a:rPr lang="en-US" dirty="0"/>
+              <a:t>-------</a:t>
+            </a:r>
+          </a:p>
+          <a:p>
+            <a:pPr algn="ctr"/>
+            <a:r>
+              <a:rPr lang="en-US" dirty="0" err="1"/>
+              <a:t>Gragoyur</a:t>
+            </a:r>
+            <a:endParaRPr lang="en-US" dirty="0"/>
+          </a:p>
+          <a:p>
+            <a:pPr algn="ctr"/>
+            <a:r>
+              <a:rPr lang="en-US" strike="sngStrike" dirty="0"/>
+              <a:t>12345789/</a:t>
+            </a:r>
+            <a:r>
+              <a:rPr lang="en-US" dirty="0"/>
+              <a:t>98765431</a:t>
+            </a:r>
+            <a:endParaRPr lang="en-US" strike="sngStrike" dirty="0"/>
+          </a:p>
+          <a:p>
+            <a:pPr algn="ctr"/>
+            <a:r>
+              <a:rPr lang="en-US" dirty="0"/>
+              <a:t>brand</a:t>
+            </a:r>
+          </a:p>
+        </p:txBody>
+      </p:sp>
+      <p:cxnSp>
+        <p:nvCxnSpPr>
+          <p:cNvPr id="19" name="Straight Arrow Connector 18">
+            <a:extLst>
+              <a:ext uri="{FF2B5EF4-FFF2-40B4-BE49-F238E27FC236}">
+                <a16:creationId xmlns:a16="http://schemas.microsoft.com/office/drawing/2014/main" id="{187F9292-522E-4EA8-953E-C8009F3557B8}"/>
+              </a:ext>
+            </a:extLst>
+          </p:cNvPr>
+          <p:cNvCxnSpPr>
+            <a:cxnSpLocks/>
+          </p:cNvCxnSpPr>
+          <p:nvPr/>
+        </p:nvCxnSpPr>
+        <p:spPr>
+          <a:xfrm>
+            <a:off x="5586074" y="3270459"/>
+            <a:ext cx="2413843" cy="26002"/>
+          </a:xfrm>
+          <a:prstGeom prst="straightConnector1">
+            <a:avLst/>
+          </a:prstGeom>
+          <a:ln>
+            <a:tailEnd type="triangle"/>
+          </a:ln>
+        </p:spPr>
+        <p:style>
+          <a:lnRef idx="1">
+            <a:schemeClr val="accent1"/>
+          </a:lnRef>
+          <a:fillRef idx="0">
+            <a:schemeClr val="accent1"/>
+          </a:fillRef>
+          <a:effectRef idx="0">
+            <a:schemeClr val="accent1"/>
+          </a:effectRef>
+          <a:fontRef idx="minor">
+            <a:schemeClr val="tx1"/>
+          </a:fontRef>
+        </p:style>
+      </p:cxnSp>
+      <p:cxnSp>
+        <p:nvCxnSpPr>
+          <p:cNvPr id="23" name="Straight Arrow Connector 22">
+            <a:extLst>
+              <a:ext uri="{FF2B5EF4-FFF2-40B4-BE49-F238E27FC236}">
+                <a16:creationId xmlns:a16="http://schemas.microsoft.com/office/drawing/2014/main" id="{6DB53E01-6306-4D73-9C74-14ED257E2FCC}"/>
+              </a:ext>
+            </a:extLst>
+          </p:cNvPr>
+          <p:cNvCxnSpPr>
+            <a:cxnSpLocks/>
+          </p:cNvCxnSpPr>
+          <p:nvPr/>
+        </p:nvCxnSpPr>
+        <p:spPr>
+          <a:xfrm flipV="1">
+            <a:off x="8876759" y="1786005"/>
+            <a:ext cx="0" cy="2019480"/>
+          </a:xfrm>
+          <a:prstGeom prst="straightConnector1">
+            <a:avLst/>
+          </a:prstGeom>
+          <a:ln>
+            <a:tailEnd type="triangle"/>
+          </a:ln>
+        </p:spPr>
+        <p:style>
+          <a:lnRef idx="1">
+            <a:schemeClr val="accent1"/>
+          </a:lnRef>
+          <a:fillRef idx="0">
+            <a:schemeClr val="accent1"/>
+          </a:fillRef>
+          <a:effectRef idx="0">
+            <a:schemeClr val="accent1"/>
+          </a:effectRef>
+          <a:fontRef idx="minor">
+            <a:schemeClr val="tx1"/>
+          </a:fontRef>
+        </p:style>
+      </p:cxnSp>
+      <p:sp>
+        <p:nvSpPr>
+          <p:cNvPr id="26" name="Rectangle 25">
+            <a:extLst>
+              <a:ext uri="{FF2B5EF4-FFF2-40B4-BE49-F238E27FC236}">
+                <a16:creationId xmlns:a16="http://schemas.microsoft.com/office/drawing/2014/main" id="{E96F8F03-38A8-40BA-B32A-F98D43A6585C}"/>
+              </a:ext>
+            </a:extLst>
+          </p:cNvPr>
+          <p:cNvSpPr/>
+          <p:nvPr/>
+        </p:nvSpPr>
+        <p:spPr>
+          <a:xfrm>
+            <a:off x="772472" y="3676909"/>
+            <a:ext cx="2000702" cy="639936"/>
+          </a:xfrm>
+          <a:prstGeom prst="rect">
+            <a:avLst/>
+          </a:prstGeom>
+        </p:spPr>
+        <p:style>
+          <a:lnRef idx="2">
+            <a:schemeClr val="accent1"/>
+          </a:lnRef>
+          <a:fillRef idx="1">
+            <a:schemeClr val="lt1"/>
+          </a:fillRef>
+          <a:effectRef idx="0">
+            <a:schemeClr val="accent1"/>
+          </a:effectRef>
+          <a:fontRef idx="minor">
+            <a:schemeClr val="dk1"/>
+          </a:fontRef>
+        </p:style>
+        <p:txBody>
+          <a:bodyPr rtlCol="0" anchor="t"/>
+          <a:lstStyle/>
+          <a:p>
+            <a:pPr algn="ctr"/>
+            <a:r>
+              <a:rPr lang="en-US" dirty="0"/>
+              <a:t>Engine</a:t>
+            </a:r>
+          </a:p>
+        </p:txBody>
+      </p:sp>
+      <p:sp>
+        <p:nvSpPr>
+          <p:cNvPr id="27" name="Rectangle 26">
+            <a:extLst>
+              <a:ext uri="{FF2B5EF4-FFF2-40B4-BE49-F238E27FC236}">
+                <a16:creationId xmlns:a16="http://schemas.microsoft.com/office/drawing/2014/main" id="{38F9BE29-71A8-4D43-928B-7047B09D8CC4}"/>
+              </a:ext>
+            </a:extLst>
+          </p:cNvPr>
+          <p:cNvSpPr/>
+          <p:nvPr/>
+        </p:nvSpPr>
+        <p:spPr>
+          <a:xfrm>
+            <a:off x="4751847" y="4297352"/>
+            <a:ext cx="1092080" cy="286020"/>
+          </a:xfrm>
+          <a:prstGeom prst="rect">
+            <a:avLst/>
+          </a:prstGeom>
+        </p:spPr>
+        <p:style>
+          <a:lnRef idx="2">
+            <a:schemeClr val="accent1">
+              <a:shade val="50000"/>
+            </a:schemeClr>
+          </a:lnRef>
+          <a:fillRef idx="1">
+            <a:schemeClr val="accent1"/>
+          </a:fillRef>
+          <a:effectRef idx="0">
+            <a:schemeClr val="accent1"/>
+          </a:effectRef>
+          <a:fontRef idx="minor">
+            <a:schemeClr val="lt1"/>
+          </a:fontRef>
+        </p:style>
+        <p:txBody>
+          <a:bodyPr rtlCol="0" anchor="ctr"/>
+          <a:lstStyle/>
+          <a:p>
+            <a:pPr algn="ctr"/>
+            <a:r>
+              <a:rPr lang="en-US" dirty="0"/>
+              <a:t>engine1</a:t>
+            </a:r>
+          </a:p>
+        </p:txBody>
+      </p:sp>
+      <p:cxnSp>
+        <p:nvCxnSpPr>
+          <p:cNvPr id="28" name="Straight Arrow Connector 27">
+            <a:extLst>
+              <a:ext uri="{FF2B5EF4-FFF2-40B4-BE49-F238E27FC236}">
+                <a16:creationId xmlns:a16="http://schemas.microsoft.com/office/drawing/2014/main" id="{7A7CA855-88C6-4237-BB48-5E5C2B6864F8}"/>
+              </a:ext>
+            </a:extLst>
+          </p:cNvPr>
+          <p:cNvCxnSpPr>
+            <a:cxnSpLocks/>
+          </p:cNvCxnSpPr>
+          <p:nvPr/>
+        </p:nvCxnSpPr>
+        <p:spPr>
+          <a:xfrm flipH="1" flipV="1">
+            <a:off x="2542408" y="4071014"/>
+            <a:ext cx="2564079" cy="421711"/>
+          </a:xfrm>
+          <a:prstGeom prst="straightConnector1">
+            <a:avLst/>
+          </a:prstGeom>
+          <a:ln>
+            <a:tailEnd type="triangle"/>
+          </a:ln>
+        </p:spPr>
+        <p:style>
+          <a:lnRef idx="1">
+            <a:schemeClr val="accent1"/>
+          </a:lnRef>
+          <a:fillRef idx="0">
+            <a:schemeClr val="accent1"/>
+          </a:fillRef>
+          <a:effectRef idx="0">
+            <a:schemeClr val="accent1"/>
+          </a:effectRef>
+          <a:fontRef idx="minor">
+            <a:schemeClr val="tx1"/>
+          </a:fontRef>
+        </p:style>
+      </p:cxnSp>
+      <p:sp>
+        <p:nvSpPr>
+          <p:cNvPr id="30" name="Rectangle 29">
+            <a:extLst>
+              <a:ext uri="{FF2B5EF4-FFF2-40B4-BE49-F238E27FC236}">
+                <a16:creationId xmlns:a16="http://schemas.microsoft.com/office/drawing/2014/main" id="{BE167FFB-EA6C-4C61-9AF3-0E16C14D3379}"/>
+              </a:ext>
+            </a:extLst>
+          </p:cNvPr>
+          <p:cNvSpPr/>
+          <p:nvPr/>
+        </p:nvSpPr>
+        <p:spPr>
+          <a:xfrm>
+            <a:off x="7091295" y="4119312"/>
+            <a:ext cx="2000702" cy="1215229"/>
+          </a:xfrm>
+          <a:prstGeom prst="rect">
+            <a:avLst/>
+          </a:prstGeom>
+        </p:spPr>
+        <p:style>
+          <a:lnRef idx="2">
+            <a:schemeClr val="accent1"/>
+          </a:lnRef>
+          <a:fillRef idx="1">
+            <a:schemeClr val="lt1"/>
+          </a:fillRef>
+          <a:effectRef idx="0">
+            <a:schemeClr val="accent1"/>
+          </a:effectRef>
+          <a:fontRef idx="minor">
+            <a:schemeClr val="dk1"/>
+          </a:fontRef>
+        </p:style>
+        <p:txBody>
+          <a:bodyPr rtlCol="0" anchor="t"/>
+          <a:lstStyle/>
+          <a:p>
+            <a:pPr algn="ctr"/>
+            <a:r>
+              <a:rPr lang="en-US" dirty="0"/>
+              <a:t>Engine</a:t>
+            </a:r>
+          </a:p>
+          <a:p>
+            <a:pPr algn="ctr"/>
+            <a:r>
+              <a:rPr lang="en-US" dirty="0"/>
+              <a:t>-----------</a:t>
+            </a:r>
+          </a:p>
+          <a:p>
+            <a:pPr algn="ctr"/>
+            <a:r>
+              <a:rPr lang="en-US" dirty="0"/>
+              <a:t>4</a:t>
+            </a:r>
+          </a:p>
+          <a:p>
+            <a:pPr algn="ctr"/>
+            <a:r>
+              <a:rPr lang="en-US" dirty="0"/>
+              <a:t>156 , turbo, 60</a:t>
+            </a:r>
+          </a:p>
+        </p:txBody>
+      </p:sp>
+      <p:sp>
+        <p:nvSpPr>
+          <p:cNvPr id="31" name="Rectangle 30">
+            <a:extLst>
+              <a:ext uri="{FF2B5EF4-FFF2-40B4-BE49-F238E27FC236}">
+                <a16:creationId xmlns:a16="http://schemas.microsoft.com/office/drawing/2014/main" id="{94224DAC-DAC2-4F58-98BA-CB3BD79E3032}"/>
+              </a:ext>
+            </a:extLst>
+          </p:cNvPr>
+          <p:cNvSpPr/>
+          <p:nvPr/>
+        </p:nvSpPr>
+        <p:spPr>
+          <a:xfrm>
+            <a:off x="771028" y="4464826"/>
+            <a:ext cx="2000702" cy="639936"/>
+          </a:xfrm>
+          <a:prstGeom prst="rect">
+            <a:avLst/>
+          </a:prstGeom>
+        </p:spPr>
+        <p:style>
+          <a:lnRef idx="2">
+            <a:schemeClr val="accent1"/>
+          </a:lnRef>
+          <a:fillRef idx="1">
+            <a:schemeClr val="lt1"/>
+          </a:fillRef>
+          <a:effectRef idx="0">
+            <a:schemeClr val="accent1"/>
+          </a:effectRef>
+          <a:fontRef idx="minor">
+            <a:schemeClr val="dk1"/>
+          </a:fontRef>
+        </p:style>
+        <p:txBody>
+          <a:bodyPr rtlCol="0" anchor="t"/>
+          <a:lstStyle/>
+          <a:p>
+            <a:pPr algn="ctr"/>
+            <a:r>
+              <a:rPr lang="en-US" dirty="0"/>
+              <a:t>Car</a:t>
+            </a:r>
+          </a:p>
+        </p:txBody>
+      </p:sp>
+      <p:sp>
+        <p:nvSpPr>
+          <p:cNvPr id="32" name="Rectangle 31">
+            <a:extLst>
+              <a:ext uri="{FF2B5EF4-FFF2-40B4-BE49-F238E27FC236}">
+                <a16:creationId xmlns:a16="http://schemas.microsoft.com/office/drawing/2014/main" id="{8DE93B71-A63C-4425-9536-D763B24555BC}"/>
+              </a:ext>
+            </a:extLst>
+          </p:cNvPr>
+          <p:cNvSpPr/>
+          <p:nvPr/>
+        </p:nvSpPr>
+        <p:spPr>
+          <a:xfrm>
+            <a:off x="4730542" y="4838555"/>
+            <a:ext cx="1092080" cy="286020"/>
+          </a:xfrm>
+          <a:prstGeom prst="rect">
+            <a:avLst/>
+          </a:prstGeom>
+        </p:spPr>
+        <p:style>
+          <a:lnRef idx="2">
+            <a:schemeClr val="accent1">
+              <a:shade val="50000"/>
+            </a:schemeClr>
+          </a:lnRef>
+          <a:fillRef idx="1">
+            <a:schemeClr val="accent1"/>
+          </a:fillRef>
+          <a:effectRef idx="0">
+            <a:schemeClr val="accent1"/>
+          </a:effectRef>
+          <a:fontRef idx="minor">
+            <a:schemeClr val="lt1"/>
+          </a:fontRef>
+        </p:style>
+        <p:txBody>
+          <a:bodyPr rtlCol="0" anchor="ctr"/>
+          <a:lstStyle/>
+          <a:p>
+            <a:pPr algn="ctr"/>
+            <a:r>
+              <a:rPr lang="en-US" dirty="0"/>
+              <a:t>c1</a:t>
+            </a:r>
+          </a:p>
+        </p:txBody>
+      </p:sp>
+      <p:cxnSp>
+        <p:nvCxnSpPr>
+          <p:cNvPr id="33" name="Straight Arrow Connector 32">
+            <a:extLst>
+              <a:ext uri="{FF2B5EF4-FFF2-40B4-BE49-F238E27FC236}">
+                <a16:creationId xmlns:a16="http://schemas.microsoft.com/office/drawing/2014/main" id="{B0B9FBC1-8BD7-456F-A62B-548EA5E0F648}"/>
+              </a:ext>
+            </a:extLst>
+          </p:cNvPr>
+          <p:cNvCxnSpPr>
+            <a:cxnSpLocks/>
+            <a:stCxn id="27" idx="3"/>
+          </p:cNvCxnSpPr>
+          <p:nvPr/>
+        </p:nvCxnSpPr>
+        <p:spPr>
+          <a:xfrm>
+            <a:off x="5843927" y="4440362"/>
+            <a:ext cx="2463679" cy="229319"/>
+          </a:xfrm>
+          <a:prstGeom prst="straightConnector1">
+            <a:avLst/>
+          </a:prstGeom>
+          <a:ln>
+            <a:tailEnd type="triangle"/>
+          </a:ln>
+        </p:spPr>
+        <p:style>
+          <a:lnRef idx="1">
+            <a:schemeClr val="accent1"/>
+          </a:lnRef>
+          <a:fillRef idx="0">
+            <a:schemeClr val="accent1"/>
+          </a:fillRef>
+          <a:effectRef idx="0">
+            <a:schemeClr val="accent1"/>
+          </a:effectRef>
+          <a:fontRef idx="minor">
+            <a:schemeClr val="tx1"/>
+          </a:fontRef>
+        </p:style>
+      </p:cxnSp>
+      <p:cxnSp>
+        <p:nvCxnSpPr>
+          <p:cNvPr id="36" name="Straight Arrow Connector 35">
+            <a:extLst>
+              <a:ext uri="{FF2B5EF4-FFF2-40B4-BE49-F238E27FC236}">
+                <a16:creationId xmlns:a16="http://schemas.microsoft.com/office/drawing/2014/main" id="{01DE7DF6-0B10-488E-A3D2-A5369AA7916A}"/>
+              </a:ext>
+            </a:extLst>
+          </p:cNvPr>
+          <p:cNvCxnSpPr>
+            <a:cxnSpLocks/>
+            <a:stCxn id="32" idx="2"/>
+            <a:endCxn id="31" idx="3"/>
+          </p:cNvCxnSpPr>
+          <p:nvPr/>
+        </p:nvCxnSpPr>
+        <p:spPr>
+          <a:xfrm flipH="1" flipV="1">
+            <a:off x="2771730" y="4784794"/>
+            <a:ext cx="2504852" cy="339781"/>
+          </a:xfrm>
+          <a:prstGeom prst="straightConnector1">
+            <a:avLst/>
+          </a:prstGeom>
+          <a:ln>
+            <a:tailEnd type="triangle"/>
+          </a:ln>
+        </p:spPr>
+        <p:style>
+          <a:lnRef idx="1">
+            <a:schemeClr val="accent1"/>
+          </a:lnRef>
+          <a:fillRef idx="0">
+            <a:schemeClr val="accent1"/>
+          </a:fillRef>
+          <a:effectRef idx="0">
+            <a:schemeClr val="accent1"/>
+          </a:effectRef>
+          <a:fontRef idx="minor">
+            <a:schemeClr val="tx1"/>
+          </a:fontRef>
+        </p:style>
+      </p:cxnSp>
+      <p:sp>
+        <p:nvSpPr>
+          <p:cNvPr id="37" name="Rectangle 36">
+            <a:extLst>
+              <a:ext uri="{FF2B5EF4-FFF2-40B4-BE49-F238E27FC236}">
+                <a16:creationId xmlns:a16="http://schemas.microsoft.com/office/drawing/2014/main" id="{27456827-2F90-426B-A0CE-A7A8386534F3}"/>
+              </a:ext>
+            </a:extLst>
+          </p:cNvPr>
+          <p:cNvSpPr/>
+          <p:nvPr/>
+        </p:nvSpPr>
+        <p:spPr>
+          <a:xfrm>
+            <a:off x="9297843" y="2685912"/>
+            <a:ext cx="2000702" cy="1215229"/>
+          </a:xfrm>
+          <a:prstGeom prst="rect">
+            <a:avLst/>
+          </a:prstGeom>
+        </p:spPr>
+        <p:style>
+          <a:lnRef idx="2">
+            <a:schemeClr val="accent1"/>
+          </a:lnRef>
+          <a:fillRef idx="1">
+            <a:schemeClr val="lt1"/>
+          </a:fillRef>
+          <a:effectRef idx="0">
+            <a:schemeClr val="accent1"/>
+          </a:effectRef>
+          <a:fontRef idx="minor">
+            <a:schemeClr val="dk1"/>
+          </a:fontRef>
+        </p:style>
+        <p:txBody>
+          <a:bodyPr rtlCol="0" anchor="t"/>
+          <a:lstStyle/>
+          <a:p>
+            <a:pPr algn="ctr"/>
+            <a:r>
+              <a:rPr lang="en-US" dirty="0"/>
+              <a:t>Car</a:t>
+            </a:r>
+          </a:p>
+          <a:p>
+            <a:pPr algn="ctr"/>
+            <a:r>
+              <a:rPr lang="en-US" dirty="0"/>
+              <a:t>---</a:t>
+            </a:r>
+          </a:p>
+          <a:p>
+            <a:pPr algn="ctr"/>
+            <a:r>
+              <a:rPr lang="en-US" dirty="0" err="1"/>
+              <a:t>Merces</a:t>
+            </a:r>
+            <a:r>
+              <a:rPr lang="en-US" dirty="0"/>
+              <a:t>, red, 2010, 10000, </a:t>
+            </a:r>
+            <a:r>
+              <a:rPr lang="en-US" dirty="0" err="1"/>
+              <a:t>dfsdfd</a:t>
+            </a:r>
+            <a:r>
+              <a:rPr lang="en-US" dirty="0"/>
+              <a:t> </a:t>
+            </a:r>
+          </a:p>
+        </p:txBody>
+      </p:sp>
+      <p:cxnSp>
+        <p:nvCxnSpPr>
+          <p:cNvPr id="41" name="Straight Arrow Connector 40">
+            <a:extLst>
+              <a:ext uri="{FF2B5EF4-FFF2-40B4-BE49-F238E27FC236}">
+                <a16:creationId xmlns:a16="http://schemas.microsoft.com/office/drawing/2014/main" id="{C060A452-5FAB-4F7D-ACBA-145AE62A0162}"/>
+              </a:ext>
+            </a:extLst>
+          </p:cNvPr>
+          <p:cNvCxnSpPr>
+            <a:cxnSpLocks/>
+          </p:cNvCxnSpPr>
+          <p:nvPr/>
+        </p:nvCxnSpPr>
+        <p:spPr>
+          <a:xfrm flipH="1" flipV="1">
+            <a:off x="8597239" y="3553321"/>
+            <a:ext cx="1968198" cy="146689"/>
+          </a:xfrm>
+          <a:prstGeom prst="straightConnector1">
+            <a:avLst/>
+          </a:prstGeom>
+          <a:ln>
+            <a:tailEnd type="triangle"/>
+          </a:ln>
+        </p:spPr>
+        <p:style>
+          <a:lnRef idx="1">
+            <a:schemeClr val="accent1"/>
+          </a:lnRef>
+          <a:fillRef idx="0">
+            <a:schemeClr val="accent1"/>
+          </a:fillRef>
+          <a:effectRef idx="0">
+            <a:schemeClr val="accent1"/>
+          </a:effectRef>
+          <a:fontRef idx="minor">
+            <a:schemeClr val="tx1"/>
+          </a:fontRef>
+        </p:style>
+      </p:cxnSp>
+      <p:cxnSp>
+        <p:nvCxnSpPr>
+          <p:cNvPr id="45" name="Straight Arrow Connector 44">
+            <a:extLst>
+              <a:ext uri="{FF2B5EF4-FFF2-40B4-BE49-F238E27FC236}">
+                <a16:creationId xmlns:a16="http://schemas.microsoft.com/office/drawing/2014/main" id="{DE4D44F4-8B58-49A1-BAB3-5518F66CCD3F}"/>
+              </a:ext>
+            </a:extLst>
+          </p:cNvPr>
+          <p:cNvCxnSpPr>
+            <a:cxnSpLocks/>
+          </p:cNvCxnSpPr>
+          <p:nvPr/>
+        </p:nvCxnSpPr>
+        <p:spPr>
+          <a:xfrm flipH="1">
+            <a:off x="8797309" y="3741654"/>
+            <a:ext cx="1786184" cy="1011635"/>
+          </a:xfrm>
+          <a:prstGeom prst="straightConnector1">
+            <a:avLst/>
+          </a:prstGeom>
+          <a:ln>
+            <a:tailEnd type="triangle"/>
+          </a:ln>
+        </p:spPr>
+        <p:style>
+          <a:lnRef idx="1">
+            <a:schemeClr val="accent1"/>
+          </a:lnRef>
+          <a:fillRef idx="0">
+            <a:schemeClr val="accent1"/>
+          </a:fillRef>
+          <a:effectRef idx="0">
+            <a:schemeClr val="accent1"/>
+          </a:effectRef>
+          <a:fontRef idx="minor">
+            <a:schemeClr val="tx1"/>
+          </a:fontRef>
+        </p:style>
+      </p:cxnSp>
+      <p:sp>
+        <p:nvSpPr>
+          <p:cNvPr id="51" name="Rectangle 50">
+            <a:extLst>
+              <a:ext uri="{FF2B5EF4-FFF2-40B4-BE49-F238E27FC236}">
+                <a16:creationId xmlns:a16="http://schemas.microsoft.com/office/drawing/2014/main" id="{B81677C8-B3EE-4C81-A262-7E8A156BD03D}"/>
+              </a:ext>
+            </a:extLst>
+          </p:cNvPr>
+          <p:cNvSpPr/>
+          <p:nvPr/>
+        </p:nvSpPr>
+        <p:spPr>
+          <a:xfrm>
+            <a:off x="4780015" y="5470235"/>
+            <a:ext cx="1092080" cy="286020"/>
+          </a:xfrm>
+          <a:prstGeom prst="rect">
+            <a:avLst/>
+          </a:prstGeom>
+        </p:spPr>
+        <p:style>
+          <a:lnRef idx="2">
+            <a:schemeClr val="accent1">
+              <a:shade val="50000"/>
+            </a:schemeClr>
+          </a:lnRef>
+          <a:fillRef idx="1">
+            <a:schemeClr val="accent1"/>
+          </a:fillRef>
+          <a:effectRef idx="0">
+            <a:schemeClr val="accent1"/>
+          </a:effectRef>
+          <a:fontRef idx="minor">
+            <a:schemeClr val="lt1"/>
+          </a:fontRef>
+        </p:style>
+        <p:txBody>
+          <a:bodyPr rtlCol="0" anchor="ctr"/>
+          <a:lstStyle/>
+          <a:p>
+            <a:pPr algn="ctr"/>
+            <a:r>
+              <a:rPr lang="en-US" dirty="0"/>
+              <a:t>engine2</a:t>
+            </a:r>
+          </a:p>
+        </p:txBody>
+      </p:sp>
+      <p:cxnSp>
+        <p:nvCxnSpPr>
+          <p:cNvPr id="52" name="Straight Arrow Connector 51">
+            <a:extLst>
+              <a:ext uri="{FF2B5EF4-FFF2-40B4-BE49-F238E27FC236}">
+                <a16:creationId xmlns:a16="http://schemas.microsoft.com/office/drawing/2014/main" id="{E9B5D56B-4E9C-43F9-9CEB-58B7624DC44D}"/>
+              </a:ext>
+            </a:extLst>
+          </p:cNvPr>
+          <p:cNvCxnSpPr>
+            <a:cxnSpLocks/>
+            <a:stCxn id="51" idx="1"/>
+          </p:cNvCxnSpPr>
+          <p:nvPr/>
+        </p:nvCxnSpPr>
+        <p:spPr>
+          <a:xfrm flipH="1" flipV="1">
+            <a:off x="2694809" y="4223415"/>
+            <a:ext cx="2085206" cy="1389830"/>
+          </a:xfrm>
+          <a:prstGeom prst="straightConnector1">
+            <a:avLst/>
+          </a:prstGeom>
+          <a:ln>
+            <a:tailEnd type="triangle"/>
+          </a:ln>
+        </p:spPr>
+        <p:style>
+          <a:lnRef idx="1">
+            <a:schemeClr val="accent1"/>
+          </a:lnRef>
+          <a:fillRef idx="0">
+            <a:schemeClr val="accent1"/>
+          </a:fillRef>
+          <a:effectRef idx="0">
+            <a:schemeClr val="accent1"/>
+          </a:effectRef>
+          <a:fontRef idx="minor">
+            <a:schemeClr val="tx1"/>
+          </a:fontRef>
+        </p:style>
+      </p:cxnSp>
+      <p:sp>
+        <p:nvSpPr>
+          <p:cNvPr id="54" name="Rectangle 53">
+            <a:extLst>
+              <a:ext uri="{FF2B5EF4-FFF2-40B4-BE49-F238E27FC236}">
+                <a16:creationId xmlns:a16="http://schemas.microsoft.com/office/drawing/2014/main" id="{B9F8B2AD-4A3A-492C-B90F-425EA7EB51BE}"/>
+              </a:ext>
+            </a:extLst>
+          </p:cNvPr>
+          <p:cNvSpPr/>
+          <p:nvPr/>
+        </p:nvSpPr>
+        <p:spPr>
+          <a:xfrm>
+            <a:off x="7075766" y="5381757"/>
+            <a:ext cx="2000702" cy="1215229"/>
+          </a:xfrm>
+          <a:prstGeom prst="rect">
+            <a:avLst/>
+          </a:prstGeom>
+        </p:spPr>
+        <p:style>
+          <a:lnRef idx="2">
+            <a:schemeClr val="accent1"/>
+          </a:lnRef>
+          <a:fillRef idx="1">
+            <a:schemeClr val="lt1"/>
+          </a:fillRef>
+          <a:effectRef idx="0">
+            <a:schemeClr val="accent1"/>
+          </a:effectRef>
+          <a:fontRef idx="minor">
+            <a:schemeClr val="dk1"/>
+          </a:fontRef>
+        </p:style>
+        <p:txBody>
+          <a:bodyPr rtlCol="0" anchor="t"/>
+          <a:lstStyle/>
+          <a:p>
+            <a:pPr algn="ctr"/>
+            <a:r>
+              <a:rPr lang="en-US" dirty="0"/>
+              <a:t>Engine</a:t>
+            </a:r>
+          </a:p>
+          <a:p>
+            <a:pPr algn="ctr"/>
+            <a:r>
+              <a:rPr lang="en-US" dirty="0"/>
+              <a:t>-----------</a:t>
+            </a:r>
+          </a:p>
+          <a:p>
+            <a:pPr algn="ctr"/>
+            <a:r>
+              <a:rPr lang="en-US" dirty="0"/>
+              <a:t>4</a:t>
+            </a:r>
+          </a:p>
+          <a:p>
+            <a:pPr algn="ctr"/>
+            <a:r>
+              <a:rPr lang="en-US" dirty="0"/>
+              <a:t>156 , turbo, 80</a:t>
+            </a:r>
+          </a:p>
+        </p:txBody>
+      </p:sp>
+      <p:sp>
+        <p:nvSpPr>
+          <p:cNvPr id="56" name="Rectangle 55">
+            <a:extLst>
+              <a:ext uri="{FF2B5EF4-FFF2-40B4-BE49-F238E27FC236}">
+                <a16:creationId xmlns:a16="http://schemas.microsoft.com/office/drawing/2014/main" id="{5BA44287-005C-48CE-A2B2-F80CC0C41398}"/>
+              </a:ext>
+            </a:extLst>
+          </p:cNvPr>
+          <p:cNvSpPr/>
+          <p:nvPr/>
+        </p:nvSpPr>
+        <p:spPr>
+          <a:xfrm>
+            <a:off x="4755097" y="6057789"/>
+            <a:ext cx="1092080" cy="286020"/>
+          </a:xfrm>
+          <a:prstGeom prst="rect">
+            <a:avLst/>
+          </a:prstGeom>
+        </p:spPr>
+        <p:style>
+          <a:lnRef idx="2">
+            <a:schemeClr val="accent1">
+              <a:shade val="50000"/>
+            </a:schemeClr>
+          </a:lnRef>
+          <a:fillRef idx="1">
+            <a:schemeClr val="accent1"/>
+          </a:fillRef>
+          <a:effectRef idx="0">
+            <a:schemeClr val="accent1"/>
+          </a:effectRef>
+          <a:fontRef idx="minor">
+            <a:schemeClr val="lt1"/>
+          </a:fontRef>
+        </p:style>
+        <p:txBody>
+          <a:bodyPr rtlCol="0" anchor="ctr"/>
+          <a:lstStyle/>
+          <a:p>
+            <a:pPr algn="ctr"/>
+            <a:r>
+              <a:rPr lang="en-US" dirty="0"/>
+              <a:t>c2</a:t>
+            </a:r>
+          </a:p>
+        </p:txBody>
+      </p:sp>
+      <p:cxnSp>
+        <p:nvCxnSpPr>
+          <p:cNvPr id="57" name="Straight Arrow Connector 56">
+            <a:extLst>
+              <a:ext uri="{FF2B5EF4-FFF2-40B4-BE49-F238E27FC236}">
+                <a16:creationId xmlns:a16="http://schemas.microsoft.com/office/drawing/2014/main" id="{D44D8D5C-FC29-4AEA-95EB-41DDBFBE05BA}"/>
+              </a:ext>
+            </a:extLst>
+          </p:cNvPr>
+          <p:cNvCxnSpPr>
+            <a:cxnSpLocks/>
+            <a:stCxn id="56" idx="1"/>
+          </p:cNvCxnSpPr>
+          <p:nvPr/>
+        </p:nvCxnSpPr>
+        <p:spPr>
+          <a:xfrm flipH="1" flipV="1">
+            <a:off x="2694809" y="4989835"/>
+            <a:ext cx="2060288" cy="1210964"/>
+          </a:xfrm>
+          <a:prstGeom prst="straightConnector1">
+            <a:avLst/>
+          </a:prstGeom>
+          <a:ln>
+            <a:tailEnd type="triangle"/>
+          </a:ln>
+        </p:spPr>
+        <p:style>
+          <a:lnRef idx="1">
+            <a:schemeClr val="accent1"/>
+          </a:lnRef>
+          <a:fillRef idx="0">
+            <a:schemeClr val="accent1"/>
+          </a:fillRef>
+          <a:effectRef idx="0">
+            <a:schemeClr val="accent1"/>
+          </a:effectRef>
+          <a:fontRef idx="minor">
+            <a:schemeClr val="tx1"/>
+          </a:fontRef>
+        </p:style>
+      </p:cxnSp>
+      <p:sp>
+        <p:nvSpPr>
+          <p:cNvPr id="60" name="Rectangle 59">
+            <a:extLst>
+              <a:ext uri="{FF2B5EF4-FFF2-40B4-BE49-F238E27FC236}">
+                <a16:creationId xmlns:a16="http://schemas.microsoft.com/office/drawing/2014/main" id="{4B1AAD07-FF54-4879-AE67-D7E7A01F9C40}"/>
+              </a:ext>
+            </a:extLst>
+          </p:cNvPr>
+          <p:cNvSpPr/>
+          <p:nvPr/>
+        </p:nvSpPr>
+        <p:spPr>
+          <a:xfrm>
+            <a:off x="9362308" y="5201416"/>
+            <a:ext cx="2000702" cy="1215229"/>
+          </a:xfrm>
+          <a:prstGeom prst="rect">
+            <a:avLst/>
+          </a:prstGeom>
+        </p:spPr>
+        <p:style>
+          <a:lnRef idx="2">
+            <a:schemeClr val="accent1"/>
+          </a:lnRef>
+          <a:fillRef idx="1">
+            <a:schemeClr val="lt1"/>
+          </a:fillRef>
+          <a:effectRef idx="0">
+            <a:schemeClr val="accent1"/>
+          </a:effectRef>
+          <a:fontRef idx="minor">
+            <a:schemeClr val="dk1"/>
+          </a:fontRef>
+        </p:style>
+        <p:txBody>
+          <a:bodyPr rtlCol="0" anchor="t"/>
+          <a:lstStyle/>
+          <a:p>
+            <a:pPr algn="ctr"/>
+            <a:r>
+              <a:rPr lang="en-US" dirty="0"/>
+              <a:t>Car</a:t>
+            </a:r>
+          </a:p>
+          <a:p>
+            <a:pPr algn="ctr"/>
+            <a:r>
+              <a:rPr lang="en-US" dirty="0"/>
+              <a:t>---</a:t>
+            </a:r>
+          </a:p>
+          <a:p>
+            <a:pPr algn="ctr"/>
+            <a:r>
+              <a:rPr lang="en-US" dirty="0" err="1"/>
+              <a:t>Merces</a:t>
+            </a:r>
+            <a:r>
+              <a:rPr lang="en-US" dirty="0"/>
+              <a:t>, red, 2018, 20000, </a:t>
+            </a:r>
+            <a:r>
+              <a:rPr lang="en-US" dirty="0" err="1"/>
+              <a:t>dfsdfd</a:t>
+            </a:r>
+            <a:r>
+              <a:rPr lang="en-US" dirty="0"/>
+              <a:t> </a:t>
+            </a:r>
+          </a:p>
+        </p:txBody>
+      </p:sp>
+      <p:cxnSp>
+        <p:nvCxnSpPr>
+          <p:cNvPr id="61" name="Straight Arrow Connector 60">
+            <a:extLst>
+              <a:ext uri="{FF2B5EF4-FFF2-40B4-BE49-F238E27FC236}">
+                <a16:creationId xmlns:a16="http://schemas.microsoft.com/office/drawing/2014/main" id="{239D2416-7E86-4869-B314-EA74238D689C}"/>
+              </a:ext>
+            </a:extLst>
+          </p:cNvPr>
+          <p:cNvCxnSpPr>
+            <a:cxnSpLocks/>
+          </p:cNvCxnSpPr>
+          <p:nvPr/>
+        </p:nvCxnSpPr>
+        <p:spPr>
+          <a:xfrm flipH="1" flipV="1">
+            <a:off x="8749639" y="3705722"/>
+            <a:ext cx="1613020" cy="1907523"/>
+          </a:xfrm>
+          <a:prstGeom prst="straightConnector1">
+            <a:avLst/>
+          </a:prstGeom>
+          <a:ln>
+            <a:tailEnd type="triangle"/>
+          </a:ln>
+        </p:spPr>
+        <p:style>
+          <a:lnRef idx="1">
+            <a:schemeClr val="accent1"/>
+          </a:lnRef>
+          <a:fillRef idx="0">
+            <a:schemeClr val="accent1"/>
+          </a:fillRef>
+          <a:effectRef idx="0">
+            <a:schemeClr val="accent1"/>
+          </a:effectRef>
+          <a:fontRef idx="minor">
+            <a:schemeClr val="tx1"/>
+          </a:fontRef>
+        </p:style>
+      </p:cxnSp>
+      <p:cxnSp>
+        <p:nvCxnSpPr>
+          <p:cNvPr id="63" name="Straight Arrow Connector 62">
+            <a:extLst>
+              <a:ext uri="{FF2B5EF4-FFF2-40B4-BE49-F238E27FC236}">
+                <a16:creationId xmlns:a16="http://schemas.microsoft.com/office/drawing/2014/main" id="{B6CB019F-F076-4AC6-86E6-3264CD289068}"/>
+              </a:ext>
+            </a:extLst>
+          </p:cNvPr>
+          <p:cNvCxnSpPr>
+            <a:cxnSpLocks/>
+          </p:cNvCxnSpPr>
+          <p:nvPr/>
+        </p:nvCxnSpPr>
+        <p:spPr>
+          <a:xfrm>
+            <a:off x="5655592" y="5631060"/>
+            <a:ext cx="2158161" cy="52831"/>
+          </a:xfrm>
+          <a:prstGeom prst="straightConnector1">
+            <a:avLst/>
+          </a:prstGeom>
+          <a:ln>
+            <a:tailEnd type="triangle"/>
+          </a:ln>
+        </p:spPr>
+        <p:style>
+          <a:lnRef idx="1">
+            <a:schemeClr val="accent1"/>
+          </a:lnRef>
+          <a:fillRef idx="0">
+            <a:schemeClr val="accent1"/>
+          </a:fillRef>
+          <a:effectRef idx="0">
+            <a:schemeClr val="accent1"/>
+          </a:effectRef>
+          <a:fontRef idx="minor">
+            <a:schemeClr val="tx1"/>
+          </a:fontRef>
+        </p:style>
+      </p:cxnSp>
+      <p:cxnSp>
+        <p:nvCxnSpPr>
+          <p:cNvPr id="66" name="Straight Arrow Connector 65">
+            <a:extLst>
+              <a:ext uri="{FF2B5EF4-FFF2-40B4-BE49-F238E27FC236}">
+                <a16:creationId xmlns:a16="http://schemas.microsoft.com/office/drawing/2014/main" id="{B7886AA3-A9F6-4091-B653-6289CC1A96D1}"/>
+              </a:ext>
+            </a:extLst>
+          </p:cNvPr>
+          <p:cNvCxnSpPr>
+            <a:cxnSpLocks/>
+          </p:cNvCxnSpPr>
+          <p:nvPr/>
+        </p:nvCxnSpPr>
+        <p:spPr>
+          <a:xfrm flipH="1">
+            <a:off x="8737993" y="5876336"/>
+            <a:ext cx="1560201" cy="81301"/>
+          </a:xfrm>
+          <a:prstGeom prst="straightConnector1">
+            <a:avLst/>
+          </a:prstGeom>
+          <a:ln>
+            <a:tailEnd type="triangle"/>
+          </a:ln>
+        </p:spPr>
+        <p:style>
+          <a:lnRef idx="1">
+            <a:schemeClr val="accent1"/>
+          </a:lnRef>
+          <a:fillRef idx="0">
+            <a:schemeClr val="accent1"/>
+          </a:fillRef>
+          <a:effectRef idx="0">
+            <a:schemeClr val="accent1"/>
+          </a:effectRef>
+          <a:fontRef idx="minor">
+            <a:schemeClr val="tx1"/>
+          </a:fontRef>
+        </p:style>
+      </p:cxnSp>
+      <p:cxnSp>
+        <p:nvCxnSpPr>
+          <p:cNvPr id="70" name="Straight Arrow Connector 69">
+            <a:extLst>
+              <a:ext uri="{FF2B5EF4-FFF2-40B4-BE49-F238E27FC236}">
+                <a16:creationId xmlns:a16="http://schemas.microsoft.com/office/drawing/2014/main" id="{F53729DE-ABA9-4693-A510-B5890D76977B}"/>
+              </a:ext>
+            </a:extLst>
+          </p:cNvPr>
+          <p:cNvCxnSpPr>
+            <a:cxnSpLocks/>
+            <a:stCxn id="56" idx="3"/>
+          </p:cNvCxnSpPr>
+          <p:nvPr/>
+        </p:nvCxnSpPr>
+        <p:spPr>
+          <a:xfrm>
+            <a:off x="5847177" y="6200799"/>
+            <a:ext cx="5260778" cy="143010"/>
+          </a:xfrm>
+          <a:prstGeom prst="straightConnector1">
+            <a:avLst/>
+          </a:prstGeom>
+          <a:ln>
+            <a:tailEnd type="triangle"/>
+          </a:ln>
+        </p:spPr>
+        <p:style>
+          <a:lnRef idx="1">
+            <a:schemeClr val="accent1"/>
+          </a:lnRef>
+          <a:fillRef idx="0">
+            <a:schemeClr val="accent1"/>
+          </a:fillRef>
+          <a:effectRef idx="0">
+            <a:schemeClr val="accent1"/>
+          </a:effectRef>
+          <a:fontRef idx="minor">
+            <a:schemeClr val="tx1"/>
+          </a:fontRef>
+        </p:style>
+      </p:cxnSp>
+      <p:cxnSp>
+        <p:nvCxnSpPr>
+          <p:cNvPr id="73" name="Straight Arrow Connector 72">
+            <a:extLst>
+              <a:ext uri="{FF2B5EF4-FFF2-40B4-BE49-F238E27FC236}">
+                <a16:creationId xmlns:a16="http://schemas.microsoft.com/office/drawing/2014/main" id="{1A803D83-152A-48BE-9A32-3A3430057BC7}"/>
+              </a:ext>
+            </a:extLst>
+          </p:cNvPr>
+          <p:cNvCxnSpPr>
+            <a:cxnSpLocks/>
+            <a:stCxn id="32" idx="3"/>
+          </p:cNvCxnSpPr>
+          <p:nvPr/>
+        </p:nvCxnSpPr>
+        <p:spPr>
+          <a:xfrm flipV="1">
+            <a:off x="5822622" y="3754381"/>
+            <a:ext cx="4063058" cy="1227184"/>
+          </a:xfrm>
+          <a:prstGeom prst="straightConnector1">
+            <a:avLst/>
+          </a:prstGeom>
+          <a:ln>
+            <a:tailEnd type="triangle"/>
+          </a:ln>
+        </p:spPr>
+        <p:style>
+          <a:lnRef idx="1">
+            <a:schemeClr val="accent1"/>
+          </a:lnRef>
+          <a:fillRef idx="0">
+            <a:schemeClr val="accent1"/>
+          </a:fillRef>
+          <a:effectRef idx="0">
+            <a:schemeClr val="accent1"/>
+          </a:effectRef>
+          <a:fontRef idx="minor">
+            <a:schemeClr val="tx1"/>
+          </a:fontRef>
+        </p:style>
+      </p:cxnSp>
+    </p:spTree>
+    <p:extLst>
+      <p:ext uri="{BB962C8B-B14F-4D97-AF65-F5344CB8AC3E}">
+        <p14:creationId xmlns:p14="http://schemas.microsoft.com/office/powerpoint/2010/main" val="2955778117"/>
+      </p:ext>
+    </p:extLst>
+  </p:cSld>
+  <p:clrMapOvr>
+    <a:masterClrMapping/>
+  </p:clrMapOvr>
+</p:sld>
+</file>
+
 <file path=ppt/theme/theme1.xml><?xml version="1.0" encoding="utf-8"?>
 <a:theme xmlns:a="http://schemas.openxmlformats.org/drawingml/2006/main" name="Office Theme">
   <a:themeElements>

</xml_diff>